<commit_message>
minor edits to accomodate feedback on tourism report
</commit_message>
<xml_diff>
--- a/templates/Powerpoint_styles.pptx
+++ b/templates/Powerpoint_styles.pptx
@@ -10,11 +10,12 @@
     <p:sldId id="261" r:id="rId4"/>
     <p:sldId id="265" r:id="rId5"/>
     <p:sldId id="262" r:id="rId6"/>
-    <p:sldId id="264" r:id="rId7"/>
-    <p:sldId id="263" r:id="rId8"/>
-    <p:sldId id="257" r:id="rId9"/>
-    <p:sldId id="259" r:id="rId10"/>
-    <p:sldId id="260" r:id="rId11"/>
+    <p:sldId id="266" r:id="rId7"/>
+    <p:sldId id="264" r:id="rId8"/>
+    <p:sldId id="263" r:id="rId9"/>
+    <p:sldId id="257" r:id="rId10"/>
+    <p:sldId id="259" r:id="rId11"/>
+    <p:sldId id="260" r:id="rId12"/>
   </p:sldIdLst>
   <p:sldSz cx="9144000" cy="6858000" type="screen4x3"/>
   <p:notesSz cx="6858000" cy="9144000"/>
@@ -297,7 +298,7 @@
           <a:p>
             <a:fld id="{8EB41EDE-76F8-194F-86A0-E34104B94575}" type="datetimeFigureOut">
               <a:rPr lang="en-US" smtClean="0"/>
-              <a:t>3/30/17</a:t>
+              <a:t>4/5/17</a:t>
             </a:fld>
             <a:endParaRPr lang="en-US"/>
           </a:p>
@@ -467,7 +468,7 @@
           <a:p>
             <a:fld id="{8EB41EDE-76F8-194F-86A0-E34104B94575}" type="datetimeFigureOut">
               <a:rPr lang="en-US" smtClean="0"/>
-              <a:t>3/30/17</a:t>
+              <a:t>4/5/17</a:t>
             </a:fld>
             <a:endParaRPr lang="en-US"/>
           </a:p>
@@ -647,7 +648,7 @@
           <a:p>
             <a:fld id="{8EB41EDE-76F8-194F-86A0-E34104B94575}" type="datetimeFigureOut">
               <a:rPr lang="en-US" smtClean="0"/>
-              <a:t>3/30/17</a:t>
+              <a:t>4/5/17</a:t>
             </a:fld>
             <a:endParaRPr lang="en-US"/>
           </a:p>
@@ -817,7 +818,7 @@
           <a:p>
             <a:fld id="{8EB41EDE-76F8-194F-86A0-E34104B94575}" type="datetimeFigureOut">
               <a:rPr lang="en-US" smtClean="0"/>
-              <a:t>3/30/17</a:t>
+              <a:t>4/5/17</a:t>
             </a:fld>
             <a:endParaRPr lang="en-US"/>
           </a:p>
@@ -1063,7 +1064,7 @@
           <a:p>
             <a:fld id="{8EB41EDE-76F8-194F-86A0-E34104B94575}" type="datetimeFigureOut">
               <a:rPr lang="en-US" smtClean="0"/>
-              <a:t>3/30/17</a:t>
+              <a:t>4/5/17</a:t>
             </a:fld>
             <a:endParaRPr lang="en-US"/>
           </a:p>
@@ -1351,7 +1352,7 @@
           <a:p>
             <a:fld id="{8EB41EDE-76F8-194F-86A0-E34104B94575}" type="datetimeFigureOut">
               <a:rPr lang="en-US" smtClean="0"/>
-              <a:t>3/30/17</a:t>
+              <a:t>4/5/17</a:t>
             </a:fld>
             <a:endParaRPr lang="en-US"/>
           </a:p>
@@ -1773,7 +1774,7 @@
           <a:p>
             <a:fld id="{8EB41EDE-76F8-194F-86A0-E34104B94575}" type="datetimeFigureOut">
               <a:rPr lang="en-US" smtClean="0"/>
-              <a:t>3/30/17</a:t>
+              <a:t>4/5/17</a:t>
             </a:fld>
             <a:endParaRPr lang="en-US"/>
           </a:p>
@@ -1891,7 +1892,7 @@
           <a:p>
             <a:fld id="{8EB41EDE-76F8-194F-86A0-E34104B94575}" type="datetimeFigureOut">
               <a:rPr lang="en-US" smtClean="0"/>
-              <a:t>3/30/17</a:t>
+              <a:t>4/5/17</a:t>
             </a:fld>
             <a:endParaRPr lang="en-US"/>
           </a:p>
@@ -1986,7 +1987,7 @@
           <a:p>
             <a:fld id="{8EB41EDE-76F8-194F-86A0-E34104B94575}" type="datetimeFigureOut">
               <a:rPr lang="en-US" smtClean="0"/>
-              <a:t>3/30/17</a:t>
+              <a:t>4/5/17</a:t>
             </a:fld>
             <a:endParaRPr lang="en-US"/>
           </a:p>
@@ -2263,7 +2264,7 @@
           <a:p>
             <a:fld id="{8EB41EDE-76F8-194F-86A0-E34104B94575}" type="datetimeFigureOut">
               <a:rPr lang="en-US" smtClean="0"/>
-              <a:t>3/30/17</a:t>
+              <a:t>4/5/17</a:t>
             </a:fld>
             <a:endParaRPr lang="en-US"/>
           </a:p>
@@ -2516,7 +2517,7 @@
           <a:p>
             <a:fld id="{8EB41EDE-76F8-194F-86A0-E34104B94575}" type="datetimeFigureOut">
               <a:rPr lang="en-US" smtClean="0"/>
-              <a:t>3/30/17</a:t>
+              <a:t>4/5/17</a:t>
             </a:fld>
             <a:endParaRPr lang="en-US"/>
           </a:p>
@@ -2729,7 +2730,7 @@
           <a:p>
             <a:fld id="{8EB41EDE-76F8-194F-86A0-E34104B94575}" type="datetimeFigureOut">
               <a:rPr lang="en-US" smtClean="0"/>
-              <a:t>3/30/17</a:t>
+              <a:t>4/5/17</a:t>
             </a:fld>
             <a:endParaRPr lang="en-US"/>
           </a:p>
@@ -3163,6 +3164,81 @@
 </file>
 
 <file path=ppt/slides/slide10.xml><?xml version="1.0" encoding="utf-8"?>
+<p:sld xmlns:a="http://schemas.openxmlformats.org/drawingml/2006/main" xmlns:r="http://schemas.openxmlformats.org/officeDocument/2006/relationships" xmlns:p="http://schemas.openxmlformats.org/presentationml/2006/main">
+  <p:cSld>
+    <p:spTree>
+      <p:nvGrpSpPr>
+        <p:cNvPr id="1" name=""/>
+        <p:cNvGrpSpPr/>
+        <p:nvPr/>
+      </p:nvGrpSpPr>
+      <p:grpSpPr>
+        <a:xfrm>
+          <a:off x="0" y="0"/>
+          <a:ext cx="0" cy="0"/>
+          <a:chOff x="0" y="0"/>
+          <a:chExt cx="0" cy="0"/>
+        </a:xfrm>
+      </p:grpSpPr>
+      <p:sp>
+        <p:nvSpPr>
+          <p:cNvPr id="3" name="Rectangle 2"/>
+          <p:cNvSpPr/>
+          <p:nvPr/>
+        </p:nvSpPr>
+        <p:spPr>
+          <a:xfrm>
+            <a:off x="0" y="1882144"/>
+            <a:ext cx="9144000" cy="4975856"/>
+          </a:xfrm>
+          <a:prstGeom prst="rect">
+            <a:avLst/>
+          </a:prstGeom>
+          <a:solidFill>
+            <a:srgbClr val="F2F2F2"/>
+          </a:solidFill>
+          <a:ln>
+            <a:noFill/>
+          </a:ln>
+          <a:effectLst/>
+        </p:spPr>
+        <p:style>
+          <a:lnRef idx="1">
+            <a:schemeClr val="accent1"/>
+          </a:lnRef>
+          <a:fillRef idx="3">
+            <a:schemeClr val="accent1"/>
+          </a:fillRef>
+          <a:effectRef idx="2">
+            <a:schemeClr val="accent1"/>
+          </a:effectRef>
+          <a:fontRef idx="minor">
+            <a:schemeClr val="lt1"/>
+          </a:fontRef>
+        </p:style>
+        <p:txBody>
+          <a:bodyPr rtlCol="0" anchor="ctr"/>
+          <a:lstStyle/>
+          <a:p>
+            <a:pPr algn="ctr"/>
+            <a:endParaRPr lang="en-US"/>
+          </a:p>
+        </p:txBody>
+      </p:sp>
+    </p:spTree>
+    <p:extLst>
+      <p:ext uri="{BB962C8B-B14F-4D97-AF65-F5344CB8AC3E}">
+        <p14:creationId xmlns:p14="http://schemas.microsoft.com/office/powerpoint/2010/main" val="2553337142"/>
+      </p:ext>
+    </p:extLst>
+  </p:cSld>
+  <p:clrMapOvr>
+    <a:masterClrMapping/>
+  </p:clrMapOvr>
+</p:sld>
+</file>
+
+<file path=ppt/slides/slide11.xml><?xml version="1.0" encoding="utf-8"?>
 <p:sld xmlns:a="http://schemas.openxmlformats.org/drawingml/2006/main" xmlns:r="http://schemas.openxmlformats.org/officeDocument/2006/relationships" xmlns:p="http://schemas.openxmlformats.org/presentationml/2006/main">
   <p:cSld>
     <p:spTree>
@@ -3886,6 +3962,145 @@
               <a:avLst/>
             </a:prstGeom>
             <a:solidFill>
+              <a:srgbClr val="1874CD"/>
+            </a:solidFill>
+            <a:ln>
+              <a:noFill/>
+            </a:ln>
+            <a:effectLst/>
+          </p:spPr>
+          <p:style>
+            <a:lnRef idx="1">
+              <a:schemeClr val="accent1"/>
+            </a:lnRef>
+            <a:fillRef idx="3">
+              <a:schemeClr val="accent1"/>
+            </a:fillRef>
+            <a:effectRef idx="2">
+              <a:schemeClr val="accent1"/>
+            </a:effectRef>
+            <a:fontRef idx="minor">
+              <a:schemeClr val="lt1"/>
+            </a:fontRef>
+          </p:style>
+          <p:txBody>
+            <a:bodyPr rtlCol="0" anchor="ctr"/>
+            <a:lstStyle/>
+            <a:p>
+              <a:pPr algn="ctr"/>
+              <a:endParaRPr lang="en-US"/>
+            </a:p>
+          </p:txBody>
+        </p:sp>
+        <p:sp>
+          <p:nvSpPr>
+            <p:cNvPr id="3" name="Rectangle 2"/>
+            <p:cNvSpPr/>
+            <p:nvPr/>
+          </p:nvSpPr>
+          <p:spPr>
+            <a:xfrm>
+              <a:off x="4289338" y="0"/>
+              <a:ext cx="4755853" cy="2552718"/>
+            </a:xfrm>
+            <a:prstGeom prst="rect">
+              <a:avLst/>
+            </a:prstGeom>
+            <a:solidFill>
+              <a:schemeClr val="bg1"/>
+            </a:solidFill>
+            <a:ln w="38100" cmpd="sng">
+              <a:solidFill>
+                <a:schemeClr val="bg1">
+                  <a:lumMod val="50000"/>
+                </a:schemeClr>
+              </a:solidFill>
+            </a:ln>
+            <a:effectLst/>
+          </p:spPr>
+          <p:style>
+            <a:lnRef idx="1">
+              <a:schemeClr val="accent1"/>
+            </a:lnRef>
+            <a:fillRef idx="3">
+              <a:schemeClr val="accent1"/>
+            </a:fillRef>
+            <a:effectRef idx="2">
+              <a:schemeClr val="accent1"/>
+            </a:effectRef>
+            <a:fontRef idx="minor">
+              <a:schemeClr val="lt1"/>
+            </a:fontRef>
+          </p:style>
+          <p:txBody>
+            <a:bodyPr rtlCol="0" anchor="ctr"/>
+            <a:lstStyle/>
+            <a:p>
+              <a:pPr algn="ctr"/>
+              <a:endParaRPr lang="en-US"/>
+            </a:p>
+          </p:txBody>
+        </p:sp>
+      </p:grpSp>
+    </p:spTree>
+    <p:extLst>
+      <p:ext uri="{BB962C8B-B14F-4D97-AF65-F5344CB8AC3E}">
+        <p14:creationId xmlns:p14="http://schemas.microsoft.com/office/powerpoint/2010/main" val="2768763945"/>
+      </p:ext>
+    </p:extLst>
+  </p:cSld>
+  <p:clrMapOvr>
+    <a:masterClrMapping/>
+  </p:clrMapOvr>
+</p:sld>
+</file>
+
+<file path=ppt/slides/slide7.xml><?xml version="1.0" encoding="utf-8"?>
+<p:sld xmlns:a="http://schemas.openxmlformats.org/drawingml/2006/main" xmlns:r="http://schemas.openxmlformats.org/officeDocument/2006/relationships" xmlns:p="http://schemas.openxmlformats.org/presentationml/2006/main">
+  <p:cSld>
+    <p:spTree>
+      <p:nvGrpSpPr>
+        <p:cNvPr id="1" name=""/>
+        <p:cNvGrpSpPr/>
+        <p:nvPr/>
+      </p:nvGrpSpPr>
+      <p:grpSpPr>
+        <a:xfrm>
+          <a:off x="0" y="0"/>
+          <a:ext cx="0" cy="0"/>
+          <a:chOff x="0" y="0"/>
+          <a:chExt cx="0" cy="0"/>
+        </a:xfrm>
+      </p:grpSpPr>
+      <p:grpSp>
+        <p:nvGrpSpPr>
+          <p:cNvPr id="5" name="Group 4"/>
+          <p:cNvGrpSpPr/>
+          <p:nvPr/>
+        </p:nvGrpSpPr>
+        <p:grpSpPr>
+          <a:xfrm>
+            <a:off x="0" y="0"/>
+            <a:ext cx="9144000" cy="2552718"/>
+            <a:chOff x="0" y="0"/>
+            <a:chExt cx="9144000" cy="2552718"/>
+          </a:xfrm>
+        </p:grpSpPr>
+        <p:sp>
+          <p:nvSpPr>
+            <p:cNvPr id="4" name="Rectangle 3"/>
+            <p:cNvSpPr/>
+            <p:nvPr/>
+          </p:nvSpPr>
+          <p:spPr>
+            <a:xfrm>
+              <a:off x="0" y="0"/>
+              <a:ext cx="9144000" cy="2163979"/>
+            </a:xfrm>
+            <a:prstGeom prst="rect">
+              <a:avLst/>
+            </a:prstGeom>
+            <a:solidFill>
               <a:srgbClr val="E4790A"/>
             </a:solidFill>
             <a:ln>
@@ -3979,7 +4194,7 @@
 </p:sld>
 </file>
 
-<file path=ppt/slides/slide7.xml><?xml version="1.0" encoding="utf-8"?>
+<file path=ppt/slides/slide8.xml><?xml version="1.0" encoding="utf-8"?>
 <p:sld xmlns:a="http://schemas.openxmlformats.org/drawingml/2006/main" xmlns:r="http://schemas.openxmlformats.org/officeDocument/2006/relationships" xmlns:p="http://schemas.openxmlformats.org/presentationml/2006/main">
   <p:cSld>
     <p:spTree>
@@ -4118,7 +4333,7 @@
 </p:sld>
 </file>
 
-<file path=ppt/slides/slide8.xml><?xml version="1.0" encoding="utf-8"?>
+<file path=ppt/slides/slide9.xml><?xml version="1.0" encoding="utf-8"?>
 <p:sld xmlns:a="http://schemas.openxmlformats.org/drawingml/2006/main" xmlns:r="http://schemas.openxmlformats.org/officeDocument/2006/relationships" xmlns:p="http://schemas.openxmlformats.org/presentationml/2006/main">
   <p:cSld>
     <p:spTree>
@@ -4188,81 +4403,6 @@
     <p:extLst>
       <p:ext uri="{BB962C8B-B14F-4D97-AF65-F5344CB8AC3E}">
         <p14:creationId xmlns:p14="http://schemas.microsoft.com/office/powerpoint/2010/main" val="345547285"/>
-      </p:ext>
-    </p:extLst>
-  </p:cSld>
-  <p:clrMapOvr>
-    <a:masterClrMapping/>
-  </p:clrMapOvr>
-</p:sld>
-</file>
-
-<file path=ppt/slides/slide9.xml><?xml version="1.0" encoding="utf-8"?>
-<p:sld xmlns:a="http://schemas.openxmlformats.org/drawingml/2006/main" xmlns:r="http://schemas.openxmlformats.org/officeDocument/2006/relationships" xmlns:p="http://schemas.openxmlformats.org/presentationml/2006/main">
-  <p:cSld>
-    <p:spTree>
-      <p:nvGrpSpPr>
-        <p:cNvPr id="1" name=""/>
-        <p:cNvGrpSpPr/>
-        <p:nvPr/>
-      </p:nvGrpSpPr>
-      <p:grpSpPr>
-        <a:xfrm>
-          <a:off x="0" y="0"/>
-          <a:ext cx="0" cy="0"/>
-          <a:chOff x="0" y="0"/>
-          <a:chExt cx="0" cy="0"/>
-        </a:xfrm>
-      </p:grpSpPr>
-      <p:sp>
-        <p:nvSpPr>
-          <p:cNvPr id="3" name="Rectangle 2"/>
-          <p:cNvSpPr/>
-          <p:nvPr/>
-        </p:nvSpPr>
-        <p:spPr>
-          <a:xfrm>
-            <a:off x="0" y="1882144"/>
-            <a:ext cx="9144000" cy="4975856"/>
-          </a:xfrm>
-          <a:prstGeom prst="rect">
-            <a:avLst/>
-          </a:prstGeom>
-          <a:solidFill>
-            <a:srgbClr val="F2F2F2"/>
-          </a:solidFill>
-          <a:ln>
-            <a:noFill/>
-          </a:ln>
-          <a:effectLst/>
-        </p:spPr>
-        <p:style>
-          <a:lnRef idx="1">
-            <a:schemeClr val="accent1"/>
-          </a:lnRef>
-          <a:fillRef idx="3">
-            <a:schemeClr val="accent1"/>
-          </a:fillRef>
-          <a:effectRef idx="2">
-            <a:schemeClr val="accent1"/>
-          </a:effectRef>
-          <a:fontRef idx="minor">
-            <a:schemeClr val="lt1"/>
-          </a:fontRef>
-        </p:style>
-        <p:txBody>
-          <a:bodyPr rtlCol="0" anchor="ctr"/>
-          <a:lstStyle/>
-          <a:p>
-            <a:pPr algn="ctr"/>
-            <a:endParaRPr lang="en-US"/>
-          </a:p>
-        </p:txBody>
-      </p:sp>
-    </p:spTree>
-    <p:extLst>
-      <p:ext uri="{BB962C8B-B14F-4D97-AF65-F5344CB8AC3E}">
-        <p14:creationId xmlns:p14="http://schemas.microsoft.com/office/powerpoint/2010/main" val="2553337142"/>
       </p:ext>
     </p:extLst>
   </p:cSld>

</xml_diff>

<commit_message>
added a new header style for Tourism report (thinner header)
</commit_message>
<xml_diff>
--- a/templates/Powerpoint_styles.pptx
+++ b/templates/Powerpoint_styles.pptx
@@ -11,11 +11,12 @@
     <p:sldId id="265" r:id="rId5"/>
     <p:sldId id="262" r:id="rId6"/>
     <p:sldId id="266" r:id="rId7"/>
-    <p:sldId id="264" r:id="rId8"/>
-    <p:sldId id="263" r:id="rId9"/>
-    <p:sldId id="257" r:id="rId10"/>
-    <p:sldId id="259" r:id="rId11"/>
-    <p:sldId id="260" r:id="rId12"/>
+    <p:sldId id="267" r:id="rId8"/>
+    <p:sldId id="264" r:id="rId9"/>
+    <p:sldId id="263" r:id="rId10"/>
+    <p:sldId id="257" r:id="rId11"/>
+    <p:sldId id="259" r:id="rId12"/>
+    <p:sldId id="260" r:id="rId13"/>
   </p:sldIdLst>
   <p:sldSz cx="9144000" cy="6858000" type="screen4x3"/>
   <p:notesSz cx="6858000" cy="9144000"/>
@@ -114,6 +115,22 @@
       </a:defRPr>
     </a:lvl9pPr>
   </p:defaultTextStyle>
+  <p:extLst>
+    <p:ext uri="{EFAFB233-063F-42B5-8137-9DF3F51BA10A}">
+      <p15:sldGuideLst xmlns:p15="http://schemas.microsoft.com/office/powerpoint/2012/main">
+        <p15:guide id="1" orient="horz" pos="2160">
+          <p15:clr>
+            <a:srgbClr val="A4A3A4"/>
+          </p15:clr>
+        </p15:guide>
+        <p15:guide id="2" pos="2880">
+          <p15:clr>
+            <a:srgbClr val="A4A3A4"/>
+          </p15:clr>
+        </p15:guide>
+      </p15:sldGuideLst>
+    </p:ext>
+  </p:extLst>
 </p:presentation>
 </file>
 
@@ -298,7 +315,7 @@
           <a:p>
             <a:fld id="{8EB41EDE-76F8-194F-86A0-E34104B94575}" type="datetimeFigureOut">
               <a:rPr lang="en-US" smtClean="0"/>
-              <a:t>4/5/17</a:t>
+              <a:t>10/3/2017</a:t>
             </a:fld>
             <a:endParaRPr lang="en-US"/>
           </a:p>
@@ -468,7 +485,7 @@
           <a:p>
             <a:fld id="{8EB41EDE-76F8-194F-86A0-E34104B94575}" type="datetimeFigureOut">
               <a:rPr lang="en-US" smtClean="0"/>
-              <a:t>4/5/17</a:t>
+              <a:t>10/3/2017</a:t>
             </a:fld>
             <a:endParaRPr lang="en-US"/>
           </a:p>
@@ -648,7 +665,7 @@
           <a:p>
             <a:fld id="{8EB41EDE-76F8-194F-86A0-E34104B94575}" type="datetimeFigureOut">
               <a:rPr lang="en-US" smtClean="0"/>
-              <a:t>4/5/17</a:t>
+              <a:t>10/3/2017</a:t>
             </a:fld>
             <a:endParaRPr lang="en-US"/>
           </a:p>
@@ -818,7 +835,7 @@
           <a:p>
             <a:fld id="{8EB41EDE-76F8-194F-86A0-E34104B94575}" type="datetimeFigureOut">
               <a:rPr lang="en-US" smtClean="0"/>
-              <a:t>4/5/17</a:t>
+              <a:t>10/3/2017</a:t>
             </a:fld>
             <a:endParaRPr lang="en-US"/>
           </a:p>
@@ -1064,7 +1081,7 @@
           <a:p>
             <a:fld id="{8EB41EDE-76F8-194F-86A0-E34104B94575}" type="datetimeFigureOut">
               <a:rPr lang="en-US" smtClean="0"/>
-              <a:t>4/5/17</a:t>
+              <a:t>10/3/2017</a:t>
             </a:fld>
             <a:endParaRPr lang="en-US"/>
           </a:p>
@@ -1352,7 +1369,7 @@
           <a:p>
             <a:fld id="{8EB41EDE-76F8-194F-86A0-E34104B94575}" type="datetimeFigureOut">
               <a:rPr lang="en-US" smtClean="0"/>
-              <a:t>4/5/17</a:t>
+              <a:t>10/3/2017</a:t>
             </a:fld>
             <a:endParaRPr lang="en-US"/>
           </a:p>
@@ -1774,7 +1791,7 @@
           <a:p>
             <a:fld id="{8EB41EDE-76F8-194F-86A0-E34104B94575}" type="datetimeFigureOut">
               <a:rPr lang="en-US" smtClean="0"/>
-              <a:t>4/5/17</a:t>
+              <a:t>10/3/2017</a:t>
             </a:fld>
             <a:endParaRPr lang="en-US"/>
           </a:p>
@@ -1892,7 +1909,7 @@
           <a:p>
             <a:fld id="{8EB41EDE-76F8-194F-86A0-E34104B94575}" type="datetimeFigureOut">
               <a:rPr lang="en-US" smtClean="0"/>
-              <a:t>4/5/17</a:t>
+              <a:t>10/3/2017</a:t>
             </a:fld>
             <a:endParaRPr lang="en-US"/>
           </a:p>
@@ -1987,7 +2004,7 @@
           <a:p>
             <a:fld id="{8EB41EDE-76F8-194F-86A0-E34104B94575}" type="datetimeFigureOut">
               <a:rPr lang="en-US" smtClean="0"/>
-              <a:t>4/5/17</a:t>
+              <a:t>10/3/2017</a:t>
             </a:fld>
             <a:endParaRPr lang="en-US"/>
           </a:p>
@@ -2264,7 +2281,7 @@
           <a:p>
             <a:fld id="{8EB41EDE-76F8-194F-86A0-E34104B94575}" type="datetimeFigureOut">
               <a:rPr lang="en-US" smtClean="0"/>
-              <a:t>4/5/17</a:t>
+              <a:t>10/3/2017</a:t>
             </a:fld>
             <a:endParaRPr lang="en-US"/>
           </a:p>
@@ -2517,7 +2534,7 @@
           <a:p>
             <a:fld id="{8EB41EDE-76F8-194F-86A0-E34104B94575}" type="datetimeFigureOut">
               <a:rPr lang="en-US" smtClean="0"/>
-              <a:t>4/5/17</a:t>
+              <a:t>10/3/2017</a:t>
             </a:fld>
             <a:endParaRPr lang="en-US"/>
           </a:p>
@@ -2730,7 +2747,7 @@
           <a:p>
             <a:fld id="{8EB41EDE-76F8-194F-86A0-E34104B94575}" type="datetimeFigureOut">
               <a:rPr lang="en-US" smtClean="0"/>
-              <a:t>4/5/17</a:t>
+              <a:t>10/3/2017</a:t>
             </a:fld>
             <a:endParaRPr lang="en-US"/>
           </a:p>
@@ -3182,6 +3199,85 @@
       </p:grpSpPr>
       <p:sp>
         <p:nvSpPr>
+          <p:cNvPr id="4" name="Rectangle 3"/>
+          <p:cNvSpPr/>
+          <p:nvPr/>
+        </p:nvSpPr>
+        <p:spPr>
+          <a:xfrm>
+            <a:off x="4859520" y="0"/>
+            <a:ext cx="3965369" cy="2280601"/>
+          </a:xfrm>
+          <a:prstGeom prst="rect">
+            <a:avLst/>
+          </a:prstGeom>
+          <a:solidFill>
+            <a:schemeClr val="bg1"/>
+          </a:solidFill>
+          <a:ln w="38100" cmpd="sng">
+            <a:solidFill>
+              <a:schemeClr val="bg1">
+                <a:lumMod val="50000"/>
+              </a:schemeClr>
+            </a:solidFill>
+          </a:ln>
+          <a:effectLst/>
+        </p:spPr>
+        <p:style>
+          <a:lnRef idx="1">
+            <a:schemeClr val="accent1"/>
+          </a:lnRef>
+          <a:fillRef idx="3">
+            <a:schemeClr val="accent1"/>
+          </a:fillRef>
+          <a:effectRef idx="2">
+            <a:schemeClr val="accent1"/>
+          </a:effectRef>
+          <a:fontRef idx="minor">
+            <a:schemeClr val="lt1"/>
+          </a:fontRef>
+        </p:style>
+        <p:txBody>
+          <a:bodyPr rtlCol="0" anchor="ctr"/>
+          <a:lstStyle/>
+          <a:p>
+            <a:pPr algn="ctr"/>
+            <a:endParaRPr lang="en-US"/>
+          </a:p>
+        </p:txBody>
+      </p:sp>
+    </p:spTree>
+    <p:extLst>
+      <p:ext uri="{BB962C8B-B14F-4D97-AF65-F5344CB8AC3E}">
+        <p14:creationId xmlns:p14="http://schemas.microsoft.com/office/powerpoint/2010/main" val="345547285"/>
+      </p:ext>
+    </p:extLst>
+  </p:cSld>
+  <p:clrMapOvr>
+    <a:masterClrMapping/>
+  </p:clrMapOvr>
+</p:sld>
+</file>
+
+<file path=ppt/slides/slide11.xml><?xml version="1.0" encoding="utf-8"?>
+<p:sld xmlns:a="http://schemas.openxmlformats.org/drawingml/2006/main" xmlns:r="http://schemas.openxmlformats.org/officeDocument/2006/relationships" xmlns:p="http://schemas.openxmlformats.org/presentationml/2006/main">
+  <p:cSld>
+    <p:spTree>
+      <p:nvGrpSpPr>
+        <p:cNvPr id="1" name=""/>
+        <p:cNvGrpSpPr/>
+        <p:nvPr/>
+      </p:nvGrpSpPr>
+      <p:grpSpPr>
+        <a:xfrm>
+          <a:off x="0" y="0"/>
+          <a:ext cx="0" cy="0"/>
+          <a:chOff x="0" y="0"/>
+          <a:chExt cx="0" cy="0"/>
+        </a:xfrm>
+      </p:grpSpPr>
+      <p:sp>
+        <p:nvSpPr>
           <p:cNvPr id="3" name="Rectangle 2"/>
           <p:cNvSpPr/>
           <p:nvPr/>
@@ -3238,7 +3334,7 @@
 </p:sld>
 </file>
 
-<file path=ppt/slides/slide11.xml><?xml version="1.0" encoding="utf-8"?>
+<file path=ppt/slides/slide12.xml><?xml version="1.0" encoding="utf-8"?>
 <p:sld xmlns:a="http://schemas.openxmlformats.org/drawingml/2006/main" xmlns:r="http://schemas.openxmlformats.org/officeDocument/2006/relationships" xmlns:p="http://schemas.openxmlformats.org/presentationml/2006/main">
   <p:cSld>
     <p:spTree>
@@ -4080,10 +4176,10 @@
         </p:nvGrpSpPr>
         <p:grpSpPr>
           <a:xfrm>
-            <a:off x="0" y="0"/>
-            <a:ext cx="9144000" cy="2552718"/>
-            <a:chOff x="0" y="0"/>
-            <a:chExt cx="9144000" cy="2552718"/>
+            <a:off x="0" y="-1"/>
+            <a:ext cx="9144000" cy="1756230"/>
+            <a:chOff x="0" y="-1"/>
+            <a:chExt cx="9144000" cy="2163980"/>
           </a:xfrm>
         </p:grpSpPr>
         <p:sp>
@@ -4101,7 +4197,7 @@
               <a:avLst/>
             </a:prstGeom>
             <a:solidFill>
-              <a:srgbClr val="E4790A"/>
+              <a:srgbClr val="1874CD"/>
             </a:solidFill>
             <a:ln>
               <a:noFill/>
@@ -4139,8 +4235,8 @@
           </p:nvSpPr>
           <p:spPr>
             <a:xfrm>
-              <a:off x="4289338" y="0"/>
-              <a:ext cx="4755853" cy="2552718"/>
+              <a:off x="4289338" y="-1"/>
+              <a:ext cx="4755853" cy="2163979"/>
             </a:xfrm>
             <a:prstGeom prst="rect">
               <a:avLst/>
@@ -4184,7 +4280,7 @@
     </p:spTree>
     <p:extLst>
       <p:ext uri="{BB962C8B-B14F-4D97-AF65-F5344CB8AC3E}">
-        <p14:creationId xmlns:p14="http://schemas.microsoft.com/office/powerpoint/2010/main" val="3953760224"/>
+        <p14:creationId xmlns:p14="http://schemas.microsoft.com/office/powerpoint/2010/main" val="4093046458"/>
       </p:ext>
     </p:extLst>
   </p:cSld>
@@ -4240,7 +4336,7 @@
               <a:avLst/>
             </a:prstGeom>
             <a:solidFill>
-              <a:srgbClr val="722F37"/>
+              <a:srgbClr val="E4790A"/>
             </a:solidFill>
             <a:ln>
               <a:noFill/>
@@ -4323,7 +4419,7 @@
     </p:spTree>
     <p:extLst>
       <p:ext uri="{BB962C8B-B14F-4D97-AF65-F5344CB8AC3E}">
-        <p14:creationId xmlns:p14="http://schemas.microsoft.com/office/powerpoint/2010/main" val="2936764735"/>
+        <p14:creationId xmlns:p14="http://schemas.microsoft.com/office/powerpoint/2010/main" val="3953760224"/>
       </p:ext>
     </p:extLst>
   </p:cSld>
@@ -4350,59 +4446,119 @@
           <a:chExt cx="0" cy="0"/>
         </a:xfrm>
       </p:grpSpPr>
-      <p:sp>
-        <p:nvSpPr>
-          <p:cNvPr id="4" name="Rectangle 3"/>
-          <p:cNvSpPr/>
+      <p:grpSp>
+        <p:nvGrpSpPr>
+          <p:cNvPr id="5" name="Group 4"/>
+          <p:cNvGrpSpPr/>
           <p:nvPr/>
-        </p:nvSpPr>
-        <p:spPr>
+        </p:nvGrpSpPr>
+        <p:grpSpPr>
           <a:xfrm>
-            <a:off x="4859520" y="0"/>
-            <a:ext cx="3965369" cy="2280601"/>
+            <a:off x="0" y="0"/>
+            <a:ext cx="9144000" cy="2552718"/>
+            <a:chOff x="0" y="0"/>
+            <a:chExt cx="9144000" cy="2552718"/>
           </a:xfrm>
-          <a:prstGeom prst="rect">
-            <a:avLst/>
-          </a:prstGeom>
-          <a:solidFill>
-            <a:schemeClr val="bg1"/>
-          </a:solidFill>
-          <a:ln w="38100" cmpd="sng">
+        </p:grpSpPr>
+        <p:sp>
+          <p:nvSpPr>
+            <p:cNvPr id="4" name="Rectangle 3"/>
+            <p:cNvSpPr/>
+            <p:nvPr/>
+          </p:nvSpPr>
+          <p:spPr>
+            <a:xfrm>
+              <a:off x="0" y="0"/>
+              <a:ext cx="9144000" cy="2163979"/>
+            </a:xfrm>
+            <a:prstGeom prst="rect">
+              <a:avLst/>
+            </a:prstGeom>
             <a:solidFill>
-              <a:schemeClr val="bg1">
-                <a:lumMod val="50000"/>
-              </a:schemeClr>
+              <a:srgbClr val="722F37"/>
             </a:solidFill>
-          </a:ln>
-          <a:effectLst/>
-        </p:spPr>
-        <p:style>
-          <a:lnRef idx="1">
-            <a:schemeClr val="accent1"/>
-          </a:lnRef>
-          <a:fillRef idx="3">
-            <a:schemeClr val="accent1"/>
-          </a:fillRef>
-          <a:effectRef idx="2">
-            <a:schemeClr val="accent1"/>
-          </a:effectRef>
-          <a:fontRef idx="minor">
-            <a:schemeClr val="lt1"/>
-          </a:fontRef>
-        </p:style>
-        <p:txBody>
-          <a:bodyPr rtlCol="0" anchor="ctr"/>
-          <a:lstStyle/>
-          <a:p>
-            <a:pPr algn="ctr"/>
-            <a:endParaRPr lang="en-US"/>
-          </a:p>
-        </p:txBody>
-      </p:sp>
+            <a:ln>
+              <a:noFill/>
+            </a:ln>
+            <a:effectLst/>
+          </p:spPr>
+          <p:style>
+            <a:lnRef idx="1">
+              <a:schemeClr val="accent1"/>
+            </a:lnRef>
+            <a:fillRef idx="3">
+              <a:schemeClr val="accent1"/>
+            </a:fillRef>
+            <a:effectRef idx="2">
+              <a:schemeClr val="accent1"/>
+            </a:effectRef>
+            <a:fontRef idx="minor">
+              <a:schemeClr val="lt1"/>
+            </a:fontRef>
+          </p:style>
+          <p:txBody>
+            <a:bodyPr rtlCol="0" anchor="ctr"/>
+            <a:lstStyle/>
+            <a:p>
+              <a:pPr algn="ctr"/>
+              <a:endParaRPr lang="en-US"/>
+            </a:p>
+          </p:txBody>
+        </p:sp>
+        <p:sp>
+          <p:nvSpPr>
+            <p:cNvPr id="3" name="Rectangle 2"/>
+            <p:cNvSpPr/>
+            <p:nvPr/>
+          </p:nvSpPr>
+          <p:spPr>
+            <a:xfrm>
+              <a:off x="4289338" y="0"/>
+              <a:ext cx="4755853" cy="2552718"/>
+            </a:xfrm>
+            <a:prstGeom prst="rect">
+              <a:avLst/>
+            </a:prstGeom>
+            <a:solidFill>
+              <a:schemeClr val="bg1"/>
+            </a:solidFill>
+            <a:ln w="38100" cmpd="sng">
+              <a:solidFill>
+                <a:schemeClr val="bg1">
+                  <a:lumMod val="50000"/>
+                </a:schemeClr>
+              </a:solidFill>
+            </a:ln>
+            <a:effectLst/>
+          </p:spPr>
+          <p:style>
+            <a:lnRef idx="1">
+              <a:schemeClr val="accent1"/>
+            </a:lnRef>
+            <a:fillRef idx="3">
+              <a:schemeClr val="accent1"/>
+            </a:fillRef>
+            <a:effectRef idx="2">
+              <a:schemeClr val="accent1"/>
+            </a:effectRef>
+            <a:fontRef idx="minor">
+              <a:schemeClr val="lt1"/>
+            </a:fontRef>
+          </p:style>
+          <p:txBody>
+            <a:bodyPr rtlCol="0" anchor="ctr"/>
+            <a:lstStyle/>
+            <a:p>
+              <a:pPr algn="ctr"/>
+              <a:endParaRPr lang="en-US"/>
+            </a:p>
+          </p:txBody>
+        </p:sp>
+      </p:grpSp>
     </p:spTree>
     <p:extLst>
       <p:ext uri="{BB962C8B-B14F-4D97-AF65-F5344CB8AC3E}">
-        <p14:creationId xmlns:p14="http://schemas.microsoft.com/office/powerpoint/2010/main" val="345547285"/>
+        <p14:creationId xmlns:p14="http://schemas.microsoft.com/office/powerpoint/2010/main" val="2936764735"/>
       </p:ext>
     </p:extLst>
   </p:cSld>

</xml_diff>

<commit_message>
add new header style for Tourism report (4 sparklines)
</commit_message>
<xml_diff>
--- a/templates/Powerpoint_styles.pptx
+++ b/templates/Powerpoint_styles.pptx
@@ -11,12 +11,13 @@
     <p:sldId id="265" r:id="rId5"/>
     <p:sldId id="262" r:id="rId6"/>
     <p:sldId id="266" r:id="rId7"/>
-    <p:sldId id="267" r:id="rId8"/>
-    <p:sldId id="264" r:id="rId9"/>
-    <p:sldId id="263" r:id="rId10"/>
-    <p:sldId id="257" r:id="rId11"/>
-    <p:sldId id="259" r:id="rId12"/>
-    <p:sldId id="260" r:id="rId13"/>
+    <p:sldId id="268" r:id="rId8"/>
+    <p:sldId id="267" r:id="rId9"/>
+    <p:sldId id="264" r:id="rId10"/>
+    <p:sldId id="263" r:id="rId11"/>
+    <p:sldId id="257" r:id="rId12"/>
+    <p:sldId id="259" r:id="rId13"/>
+    <p:sldId id="260" r:id="rId14"/>
   </p:sldIdLst>
   <p:sldSz cx="9144000" cy="6858000" type="screen4x3"/>
   <p:notesSz cx="6858000" cy="9144000"/>
@@ -315,7 +316,7 @@
           <a:p>
             <a:fld id="{8EB41EDE-76F8-194F-86A0-E34104B94575}" type="datetimeFigureOut">
               <a:rPr lang="en-US" smtClean="0"/>
-              <a:t>10/3/2017</a:t>
+              <a:t>10/11/2017</a:t>
             </a:fld>
             <a:endParaRPr lang="en-US"/>
           </a:p>
@@ -485,7 +486,7 @@
           <a:p>
             <a:fld id="{8EB41EDE-76F8-194F-86A0-E34104B94575}" type="datetimeFigureOut">
               <a:rPr lang="en-US" smtClean="0"/>
-              <a:t>10/3/2017</a:t>
+              <a:t>10/11/2017</a:t>
             </a:fld>
             <a:endParaRPr lang="en-US"/>
           </a:p>
@@ -665,7 +666,7 @@
           <a:p>
             <a:fld id="{8EB41EDE-76F8-194F-86A0-E34104B94575}" type="datetimeFigureOut">
               <a:rPr lang="en-US" smtClean="0"/>
-              <a:t>10/3/2017</a:t>
+              <a:t>10/11/2017</a:t>
             </a:fld>
             <a:endParaRPr lang="en-US"/>
           </a:p>
@@ -835,7 +836,7 @@
           <a:p>
             <a:fld id="{8EB41EDE-76F8-194F-86A0-E34104B94575}" type="datetimeFigureOut">
               <a:rPr lang="en-US" smtClean="0"/>
-              <a:t>10/3/2017</a:t>
+              <a:t>10/11/2017</a:t>
             </a:fld>
             <a:endParaRPr lang="en-US"/>
           </a:p>
@@ -1081,7 +1082,7 @@
           <a:p>
             <a:fld id="{8EB41EDE-76F8-194F-86A0-E34104B94575}" type="datetimeFigureOut">
               <a:rPr lang="en-US" smtClean="0"/>
-              <a:t>10/3/2017</a:t>
+              <a:t>10/11/2017</a:t>
             </a:fld>
             <a:endParaRPr lang="en-US"/>
           </a:p>
@@ -1369,7 +1370,7 @@
           <a:p>
             <a:fld id="{8EB41EDE-76F8-194F-86A0-E34104B94575}" type="datetimeFigureOut">
               <a:rPr lang="en-US" smtClean="0"/>
-              <a:t>10/3/2017</a:t>
+              <a:t>10/11/2017</a:t>
             </a:fld>
             <a:endParaRPr lang="en-US"/>
           </a:p>
@@ -1791,7 +1792,7 @@
           <a:p>
             <a:fld id="{8EB41EDE-76F8-194F-86A0-E34104B94575}" type="datetimeFigureOut">
               <a:rPr lang="en-US" smtClean="0"/>
-              <a:t>10/3/2017</a:t>
+              <a:t>10/11/2017</a:t>
             </a:fld>
             <a:endParaRPr lang="en-US"/>
           </a:p>
@@ -1909,7 +1910,7 @@
           <a:p>
             <a:fld id="{8EB41EDE-76F8-194F-86A0-E34104B94575}" type="datetimeFigureOut">
               <a:rPr lang="en-US" smtClean="0"/>
-              <a:t>10/3/2017</a:t>
+              <a:t>10/11/2017</a:t>
             </a:fld>
             <a:endParaRPr lang="en-US"/>
           </a:p>
@@ -2004,7 +2005,7 @@
           <a:p>
             <a:fld id="{8EB41EDE-76F8-194F-86A0-E34104B94575}" type="datetimeFigureOut">
               <a:rPr lang="en-US" smtClean="0"/>
-              <a:t>10/3/2017</a:t>
+              <a:t>10/11/2017</a:t>
             </a:fld>
             <a:endParaRPr lang="en-US"/>
           </a:p>
@@ -2281,7 +2282,7 @@
           <a:p>
             <a:fld id="{8EB41EDE-76F8-194F-86A0-E34104B94575}" type="datetimeFigureOut">
               <a:rPr lang="en-US" smtClean="0"/>
-              <a:t>10/3/2017</a:t>
+              <a:t>10/11/2017</a:t>
             </a:fld>
             <a:endParaRPr lang="en-US"/>
           </a:p>
@@ -2534,7 +2535,7 @@
           <a:p>
             <a:fld id="{8EB41EDE-76F8-194F-86A0-E34104B94575}" type="datetimeFigureOut">
               <a:rPr lang="en-US" smtClean="0"/>
-              <a:t>10/3/2017</a:t>
+              <a:t>10/11/2017</a:t>
             </a:fld>
             <a:endParaRPr lang="en-US"/>
           </a:p>
@@ -2747,7 +2748,7 @@
           <a:p>
             <a:fld id="{8EB41EDE-76F8-194F-86A0-E34104B94575}" type="datetimeFigureOut">
               <a:rPr lang="en-US" smtClean="0"/>
-              <a:t>10/3/2017</a:t>
+              <a:t>10/11/2017</a:t>
             </a:fld>
             <a:endParaRPr lang="en-US"/>
           </a:p>
@@ -3197,6 +3198,145 @@
           <a:chExt cx="0" cy="0"/>
         </a:xfrm>
       </p:grpSpPr>
+      <p:grpSp>
+        <p:nvGrpSpPr>
+          <p:cNvPr id="5" name="Group 4"/>
+          <p:cNvGrpSpPr/>
+          <p:nvPr/>
+        </p:nvGrpSpPr>
+        <p:grpSpPr>
+          <a:xfrm>
+            <a:off x="0" y="0"/>
+            <a:ext cx="9144000" cy="2552718"/>
+            <a:chOff x="0" y="0"/>
+            <a:chExt cx="9144000" cy="2552718"/>
+          </a:xfrm>
+        </p:grpSpPr>
+        <p:sp>
+          <p:nvSpPr>
+            <p:cNvPr id="4" name="Rectangle 3"/>
+            <p:cNvSpPr/>
+            <p:nvPr/>
+          </p:nvSpPr>
+          <p:spPr>
+            <a:xfrm>
+              <a:off x="0" y="0"/>
+              <a:ext cx="9144000" cy="2163979"/>
+            </a:xfrm>
+            <a:prstGeom prst="rect">
+              <a:avLst/>
+            </a:prstGeom>
+            <a:solidFill>
+              <a:srgbClr val="722F37"/>
+            </a:solidFill>
+            <a:ln>
+              <a:noFill/>
+            </a:ln>
+            <a:effectLst/>
+          </p:spPr>
+          <p:style>
+            <a:lnRef idx="1">
+              <a:schemeClr val="accent1"/>
+            </a:lnRef>
+            <a:fillRef idx="3">
+              <a:schemeClr val="accent1"/>
+            </a:fillRef>
+            <a:effectRef idx="2">
+              <a:schemeClr val="accent1"/>
+            </a:effectRef>
+            <a:fontRef idx="minor">
+              <a:schemeClr val="lt1"/>
+            </a:fontRef>
+          </p:style>
+          <p:txBody>
+            <a:bodyPr rtlCol="0" anchor="ctr"/>
+            <a:lstStyle/>
+            <a:p>
+              <a:pPr algn="ctr"/>
+              <a:endParaRPr lang="en-US"/>
+            </a:p>
+          </p:txBody>
+        </p:sp>
+        <p:sp>
+          <p:nvSpPr>
+            <p:cNvPr id="3" name="Rectangle 2"/>
+            <p:cNvSpPr/>
+            <p:nvPr/>
+          </p:nvSpPr>
+          <p:spPr>
+            <a:xfrm>
+              <a:off x="4289338" y="0"/>
+              <a:ext cx="4755853" cy="2552718"/>
+            </a:xfrm>
+            <a:prstGeom prst="rect">
+              <a:avLst/>
+            </a:prstGeom>
+            <a:solidFill>
+              <a:schemeClr val="bg1"/>
+            </a:solidFill>
+            <a:ln w="38100" cmpd="sng">
+              <a:solidFill>
+                <a:schemeClr val="bg1">
+                  <a:lumMod val="50000"/>
+                </a:schemeClr>
+              </a:solidFill>
+            </a:ln>
+            <a:effectLst/>
+          </p:spPr>
+          <p:style>
+            <a:lnRef idx="1">
+              <a:schemeClr val="accent1"/>
+            </a:lnRef>
+            <a:fillRef idx="3">
+              <a:schemeClr val="accent1"/>
+            </a:fillRef>
+            <a:effectRef idx="2">
+              <a:schemeClr val="accent1"/>
+            </a:effectRef>
+            <a:fontRef idx="minor">
+              <a:schemeClr val="lt1"/>
+            </a:fontRef>
+          </p:style>
+          <p:txBody>
+            <a:bodyPr rtlCol="0" anchor="ctr"/>
+            <a:lstStyle/>
+            <a:p>
+              <a:pPr algn="ctr"/>
+              <a:endParaRPr lang="en-US"/>
+            </a:p>
+          </p:txBody>
+        </p:sp>
+      </p:grpSp>
+    </p:spTree>
+    <p:extLst>
+      <p:ext uri="{BB962C8B-B14F-4D97-AF65-F5344CB8AC3E}">
+        <p14:creationId xmlns:p14="http://schemas.microsoft.com/office/powerpoint/2010/main" val="2936764735"/>
+      </p:ext>
+    </p:extLst>
+  </p:cSld>
+  <p:clrMapOvr>
+    <a:masterClrMapping/>
+  </p:clrMapOvr>
+</p:sld>
+</file>
+
+<file path=ppt/slides/slide11.xml><?xml version="1.0" encoding="utf-8"?>
+<p:sld xmlns:a="http://schemas.openxmlformats.org/drawingml/2006/main" xmlns:r="http://schemas.openxmlformats.org/officeDocument/2006/relationships" xmlns:p="http://schemas.openxmlformats.org/presentationml/2006/main">
+  <p:cSld>
+    <p:spTree>
+      <p:nvGrpSpPr>
+        <p:cNvPr id="1" name=""/>
+        <p:cNvGrpSpPr/>
+        <p:nvPr/>
+      </p:nvGrpSpPr>
+      <p:grpSpPr>
+        <a:xfrm>
+          <a:off x="0" y="0"/>
+          <a:ext cx="0" cy="0"/>
+          <a:chOff x="0" y="0"/>
+          <a:chExt cx="0" cy="0"/>
+        </a:xfrm>
+      </p:grpSpPr>
       <p:sp>
         <p:nvSpPr>
           <p:cNvPr id="4" name="Rectangle 3"/>
@@ -3259,7 +3399,7 @@
 </p:sld>
 </file>
 
-<file path=ppt/slides/slide11.xml><?xml version="1.0" encoding="utf-8"?>
+<file path=ppt/slides/slide12.xml><?xml version="1.0" encoding="utf-8"?>
 <p:sld xmlns:a="http://schemas.openxmlformats.org/drawingml/2006/main" xmlns:r="http://schemas.openxmlformats.org/officeDocument/2006/relationships" xmlns:p="http://schemas.openxmlformats.org/presentationml/2006/main">
   <p:cSld>
     <p:spTree>
@@ -3334,7 +3474,7 @@
 </p:sld>
 </file>
 
-<file path=ppt/slides/slide12.xml><?xml version="1.0" encoding="utf-8"?>
+<file path=ppt/slides/slide13.xml><?xml version="1.0" encoding="utf-8"?>
 <p:sld xmlns:a="http://schemas.openxmlformats.org/drawingml/2006/main" xmlns:r="http://schemas.openxmlformats.org/officeDocument/2006/relationships" xmlns:p="http://schemas.openxmlformats.org/presentationml/2006/main">
   <p:cSld>
     <p:spTree>
@@ -4176,6 +4316,145 @@
         </p:nvGrpSpPr>
         <p:grpSpPr>
           <a:xfrm>
+            <a:off x="0" y="0"/>
+            <a:ext cx="9144000" cy="2869660"/>
+            <a:chOff x="0" y="0"/>
+            <a:chExt cx="9144000" cy="2869660"/>
+          </a:xfrm>
+        </p:grpSpPr>
+        <p:sp>
+          <p:nvSpPr>
+            <p:cNvPr id="4" name="Rectangle 3"/>
+            <p:cNvSpPr/>
+            <p:nvPr/>
+          </p:nvSpPr>
+          <p:spPr>
+            <a:xfrm>
+              <a:off x="0" y="0"/>
+              <a:ext cx="9144000" cy="2163979"/>
+            </a:xfrm>
+            <a:prstGeom prst="rect">
+              <a:avLst/>
+            </a:prstGeom>
+            <a:solidFill>
+              <a:srgbClr val="1874CD"/>
+            </a:solidFill>
+            <a:ln>
+              <a:noFill/>
+            </a:ln>
+            <a:effectLst/>
+          </p:spPr>
+          <p:style>
+            <a:lnRef idx="1">
+              <a:schemeClr val="accent1"/>
+            </a:lnRef>
+            <a:fillRef idx="3">
+              <a:schemeClr val="accent1"/>
+            </a:fillRef>
+            <a:effectRef idx="2">
+              <a:schemeClr val="accent1"/>
+            </a:effectRef>
+            <a:fontRef idx="minor">
+              <a:schemeClr val="lt1"/>
+            </a:fontRef>
+          </p:style>
+          <p:txBody>
+            <a:bodyPr rtlCol="0" anchor="ctr"/>
+            <a:lstStyle/>
+            <a:p>
+              <a:pPr algn="ctr"/>
+              <a:endParaRPr lang="en-US"/>
+            </a:p>
+          </p:txBody>
+        </p:sp>
+        <p:sp>
+          <p:nvSpPr>
+            <p:cNvPr id="3" name="Rectangle 2"/>
+            <p:cNvSpPr/>
+            <p:nvPr/>
+          </p:nvSpPr>
+          <p:spPr>
+            <a:xfrm>
+              <a:off x="5458968" y="0"/>
+              <a:ext cx="3586223" cy="2869660"/>
+            </a:xfrm>
+            <a:prstGeom prst="rect">
+              <a:avLst/>
+            </a:prstGeom>
+            <a:solidFill>
+              <a:schemeClr val="bg1"/>
+            </a:solidFill>
+            <a:ln w="38100" cmpd="sng">
+              <a:solidFill>
+                <a:schemeClr val="bg1">
+                  <a:lumMod val="50000"/>
+                </a:schemeClr>
+              </a:solidFill>
+            </a:ln>
+            <a:effectLst/>
+          </p:spPr>
+          <p:style>
+            <a:lnRef idx="1">
+              <a:schemeClr val="accent1"/>
+            </a:lnRef>
+            <a:fillRef idx="3">
+              <a:schemeClr val="accent1"/>
+            </a:fillRef>
+            <a:effectRef idx="2">
+              <a:schemeClr val="accent1"/>
+            </a:effectRef>
+            <a:fontRef idx="minor">
+              <a:schemeClr val="lt1"/>
+            </a:fontRef>
+          </p:style>
+          <p:txBody>
+            <a:bodyPr rtlCol="0" anchor="ctr"/>
+            <a:lstStyle/>
+            <a:p>
+              <a:pPr algn="ctr"/>
+              <a:endParaRPr lang="en-US"/>
+            </a:p>
+          </p:txBody>
+        </p:sp>
+      </p:grpSp>
+    </p:spTree>
+    <p:extLst>
+      <p:ext uri="{BB962C8B-B14F-4D97-AF65-F5344CB8AC3E}">
+        <p14:creationId xmlns:p14="http://schemas.microsoft.com/office/powerpoint/2010/main" val="3264262932"/>
+      </p:ext>
+    </p:extLst>
+  </p:cSld>
+  <p:clrMapOvr>
+    <a:masterClrMapping/>
+  </p:clrMapOvr>
+</p:sld>
+</file>
+
+<file path=ppt/slides/slide8.xml><?xml version="1.0" encoding="utf-8"?>
+<p:sld xmlns:a="http://schemas.openxmlformats.org/drawingml/2006/main" xmlns:r="http://schemas.openxmlformats.org/officeDocument/2006/relationships" xmlns:p="http://schemas.openxmlformats.org/presentationml/2006/main">
+  <p:cSld>
+    <p:spTree>
+      <p:nvGrpSpPr>
+        <p:cNvPr id="1" name=""/>
+        <p:cNvGrpSpPr/>
+        <p:nvPr/>
+      </p:nvGrpSpPr>
+      <p:grpSpPr>
+        <a:xfrm>
+          <a:off x="0" y="0"/>
+          <a:ext cx="0" cy="0"/>
+          <a:chOff x="0" y="0"/>
+          <a:chExt cx="0" cy="0"/>
+        </a:xfrm>
+      </p:grpSpPr>
+      <p:grpSp>
+        <p:nvGrpSpPr>
+          <p:cNvPr id="5" name="Group 4"/>
+          <p:cNvGrpSpPr/>
+          <p:nvPr/>
+        </p:nvGrpSpPr>
+        <p:grpSpPr>
+          <a:xfrm>
             <a:off x="0" y="-1"/>
             <a:ext cx="9144000" cy="1756230"/>
             <a:chOff x="0" y="-1"/>
@@ -4281,145 +4560,6 @@
     <p:extLst>
       <p:ext uri="{BB962C8B-B14F-4D97-AF65-F5344CB8AC3E}">
         <p14:creationId xmlns:p14="http://schemas.microsoft.com/office/powerpoint/2010/main" val="4093046458"/>
-      </p:ext>
-    </p:extLst>
-  </p:cSld>
-  <p:clrMapOvr>
-    <a:masterClrMapping/>
-  </p:clrMapOvr>
-</p:sld>
-</file>
-
-<file path=ppt/slides/slide8.xml><?xml version="1.0" encoding="utf-8"?>
-<p:sld xmlns:a="http://schemas.openxmlformats.org/drawingml/2006/main" xmlns:r="http://schemas.openxmlformats.org/officeDocument/2006/relationships" xmlns:p="http://schemas.openxmlformats.org/presentationml/2006/main">
-  <p:cSld>
-    <p:spTree>
-      <p:nvGrpSpPr>
-        <p:cNvPr id="1" name=""/>
-        <p:cNvGrpSpPr/>
-        <p:nvPr/>
-      </p:nvGrpSpPr>
-      <p:grpSpPr>
-        <a:xfrm>
-          <a:off x="0" y="0"/>
-          <a:ext cx="0" cy="0"/>
-          <a:chOff x="0" y="0"/>
-          <a:chExt cx="0" cy="0"/>
-        </a:xfrm>
-      </p:grpSpPr>
-      <p:grpSp>
-        <p:nvGrpSpPr>
-          <p:cNvPr id="5" name="Group 4"/>
-          <p:cNvGrpSpPr/>
-          <p:nvPr/>
-        </p:nvGrpSpPr>
-        <p:grpSpPr>
-          <a:xfrm>
-            <a:off x="0" y="0"/>
-            <a:ext cx="9144000" cy="2552718"/>
-            <a:chOff x="0" y="0"/>
-            <a:chExt cx="9144000" cy="2552718"/>
-          </a:xfrm>
-        </p:grpSpPr>
-        <p:sp>
-          <p:nvSpPr>
-            <p:cNvPr id="4" name="Rectangle 3"/>
-            <p:cNvSpPr/>
-            <p:nvPr/>
-          </p:nvSpPr>
-          <p:spPr>
-            <a:xfrm>
-              <a:off x="0" y="0"/>
-              <a:ext cx="9144000" cy="2163979"/>
-            </a:xfrm>
-            <a:prstGeom prst="rect">
-              <a:avLst/>
-            </a:prstGeom>
-            <a:solidFill>
-              <a:srgbClr val="E4790A"/>
-            </a:solidFill>
-            <a:ln>
-              <a:noFill/>
-            </a:ln>
-            <a:effectLst/>
-          </p:spPr>
-          <p:style>
-            <a:lnRef idx="1">
-              <a:schemeClr val="accent1"/>
-            </a:lnRef>
-            <a:fillRef idx="3">
-              <a:schemeClr val="accent1"/>
-            </a:fillRef>
-            <a:effectRef idx="2">
-              <a:schemeClr val="accent1"/>
-            </a:effectRef>
-            <a:fontRef idx="minor">
-              <a:schemeClr val="lt1"/>
-            </a:fontRef>
-          </p:style>
-          <p:txBody>
-            <a:bodyPr rtlCol="0" anchor="ctr"/>
-            <a:lstStyle/>
-            <a:p>
-              <a:pPr algn="ctr"/>
-              <a:endParaRPr lang="en-US"/>
-            </a:p>
-          </p:txBody>
-        </p:sp>
-        <p:sp>
-          <p:nvSpPr>
-            <p:cNvPr id="3" name="Rectangle 2"/>
-            <p:cNvSpPr/>
-            <p:nvPr/>
-          </p:nvSpPr>
-          <p:spPr>
-            <a:xfrm>
-              <a:off x="4289338" y="0"/>
-              <a:ext cx="4755853" cy="2552718"/>
-            </a:xfrm>
-            <a:prstGeom prst="rect">
-              <a:avLst/>
-            </a:prstGeom>
-            <a:solidFill>
-              <a:schemeClr val="bg1"/>
-            </a:solidFill>
-            <a:ln w="38100" cmpd="sng">
-              <a:solidFill>
-                <a:schemeClr val="bg1">
-                  <a:lumMod val="50000"/>
-                </a:schemeClr>
-              </a:solidFill>
-            </a:ln>
-            <a:effectLst/>
-          </p:spPr>
-          <p:style>
-            <a:lnRef idx="1">
-              <a:schemeClr val="accent1"/>
-            </a:lnRef>
-            <a:fillRef idx="3">
-              <a:schemeClr val="accent1"/>
-            </a:fillRef>
-            <a:effectRef idx="2">
-              <a:schemeClr val="accent1"/>
-            </a:effectRef>
-            <a:fontRef idx="minor">
-              <a:schemeClr val="lt1"/>
-            </a:fontRef>
-          </p:style>
-          <p:txBody>
-            <a:bodyPr rtlCol="0" anchor="ctr"/>
-            <a:lstStyle/>
-            <a:p>
-              <a:pPr algn="ctr"/>
-              <a:endParaRPr lang="en-US"/>
-            </a:p>
-          </p:txBody>
-        </p:sp>
-      </p:grpSp>
-    </p:spTree>
-    <p:extLst>
-      <p:ext uri="{BB962C8B-B14F-4D97-AF65-F5344CB8AC3E}">
-        <p14:creationId xmlns:p14="http://schemas.microsoft.com/office/powerpoint/2010/main" val="3953760224"/>
       </p:ext>
     </p:extLst>
   </p:cSld>
@@ -4475,7 +4615,7 @@
               <a:avLst/>
             </a:prstGeom>
             <a:solidFill>
-              <a:srgbClr val="722F37"/>
+              <a:srgbClr val="E4790A"/>
             </a:solidFill>
             <a:ln>
               <a:noFill/>
@@ -4558,7 +4698,7 @@
     </p:spTree>
     <p:extLst>
       <p:ext uri="{BB962C8B-B14F-4D97-AF65-F5344CB8AC3E}">
-        <p14:creationId xmlns:p14="http://schemas.microsoft.com/office/powerpoint/2010/main" val="2936764735"/>
+        <p14:creationId xmlns:p14="http://schemas.microsoft.com/office/powerpoint/2010/main" val="3953760224"/>
       </p:ext>
     </p:extLst>
   </p:cSld>

</xml_diff>

<commit_message>
Complete first version of FinCOm report including new colors, etc.
</commit_message>
<xml_diff>
--- a/templates/Powerpoint_styles.pptx
+++ b/templates/Powerpoint_styles.pptx
@@ -135,6 +135,10 @@
 </p:presentation>
 </file>
 
+<file path=ppt/revisionInfo.xml><?xml version="1.0" encoding="utf-8"?>
+<p1510:revInfo xmlns:a="http://schemas.openxmlformats.org/drawingml/2006/main" xmlns:r="http://schemas.openxmlformats.org/officeDocument/2006/relationships" xmlns:p1510="http://schemas.microsoft.com/office/powerpoint/2015/10/main"/>
+</file>
+
 <file path=ppt/slideLayouts/slideLayout1.xml><?xml version="1.0" encoding="utf-8"?>
 <p:sldLayout xmlns:a="http://schemas.openxmlformats.org/drawingml/2006/main" xmlns:r="http://schemas.openxmlformats.org/officeDocument/2006/relationships" xmlns:p="http://schemas.openxmlformats.org/presentationml/2006/main" type="title" preserve="1">
   <p:cSld name="Title Slide">
@@ -173,10 +177,9 @@
           <a:lstStyle/>
           <a:p>
             <a:r>
-              <a:rPr lang="en-US" smtClean="0"/>
+              <a:rPr lang="en-US"/>
               <a:t>Click to edit Master title style</a:t>
             </a:r>
-            <a:endParaRPr lang="en-US"/>
           </a:p>
         </p:txBody>
       </p:sp>
@@ -292,10 +295,9 @@
           </a:lstStyle>
           <a:p>
             <a:r>
-              <a:rPr lang="en-US" smtClean="0"/>
+              <a:rPr lang="en-US"/>
               <a:t>Click to edit Master subtitle style</a:t>
             </a:r>
-            <a:endParaRPr lang="en-US"/>
           </a:p>
         </p:txBody>
       </p:sp>
@@ -316,7 +318,7 @@
           <a:p>
             <a:fld id="{8EB41EDE-76F8-194F-86A0-E34104B94575}" type="datetimeFigureOut">
               <a:rPr lang="en-US" smtClean="0"/>
-              <a:t>10/11/2017</a:t>
+              <a:t>8/17/2018</a:t>
             </a:fld>
             <a:endParaRPr lang="en-US"/>
           </a:p>
@@ -410,10 +412,9 @@
           <a:lstStyle/>
           <a:p>
             <a:r>
-              <a:rPr lang="en-US" smtClean="0"/>
+              <a:rPr lang="en-US"/>
               <a:t>Click to edit Master title style</a:t>
             </a:r>
-            <a:endParaRPr lang="en-US"/>
           </a:p>
         </p:txBody>
       </p:sp>
@@ -434,38 +435,37 @@
           <a:p>
             <a:pPr lvl="0"/>
             <a:r>
-              <a:rPr lang="en-US" smtClean="0"/>
+              <a:rPr lang="en-US"/>
               <a:t>Click to edit Master text styles</a:t>
             </a:r>
           </a:p>
           <a:p>
             <a:pPr lvl="1"/>
             <a:r>
-              <a:rPr lang="en-US" smtClean="0"/>
+              <a:rPr lang="en-US"/>
               <a:t>Second level</a:t>
             </a:r>
           </a:p>
           <a:p>
             <a:pPr lvl="2"/>
             <a:r>
-              <a:rPr lang="en-US" smtClean="0"/>
+              <a:rPr lang="en-US"/>
               <a:t>Third level</a:t>
             </a:r>
           </a:p>
           <a:p>
             <a:pPr lvl="3"/>
             <a:r>
-              <a:rPr lang="en-US" smtClean="0"/>
+              <a:rPr lang="en-US"/>
               <a:t>Fourth level</a:t>
             </a:r>
           </a:p>
           <a:p>
             <a:pPr lvl="4"/>
             <a:r>
-              <a:rPr lang="en-US" smtClean="0"/>
+              <a:rPr lang="en-US"/>
               <a:t>Fifth level</a:t>
             </a:r>
-            <a:endParaRPr lang="en-US"/>
           </a:p>
         </p:txBody>
       </p:sp>
@@ -486,7 +486,7 @@
           <a:p>
             <a:fld id="{8EB41EDE-76F8-194F-86A0-E34104B94575}" type="datetimeFigureOut">
               <a:rPr lang="en-US" smtClean="0"/>
-              <a:t>10/11/2017</a:t>
+              <a:t>8/17/2018</a:t>
             </a:fld>
             <a:endParaRPr lang="en-US"/>
           </a:p>
@@ -585,10 +585,9 @@
           <a:lstStyle/>
           <a:p>
             <a:r>
-              <a:rPr lang="en-US" smtClean="0"/>
+              <a:rPr lang="en-US"/>
               <a:t>Click to edit Master title style</a:t>
             </a:r>
-            <a:endParaRPr lang="en-US"/>
           </a:p>
         </p:txBody>
       </p:sp>
@@ -614,38 +613,37 @@
           <a:p>
             <a:pPr lvl="0"/>
             <a:r>
-              <a:rPr lang="en-US" smtClean="0"/>
+              <a:rPr lang="en-US"/>
               <a:t>Click to edit Master text styles</a:t>
             </a:r>
           </a:p>
           <a:p>
             <a:pPr lvl="1"/>
             <a:r>
-              <a:rPr lang="en-US" smtClean="0"/>
+              <a:rPr lang="en-US"/>
               <a:t>Second level</a:t>
             </a:r>
           </a:p>
           <a:p>
             <a:pPr lvl="2"/>
             <a:r>
-              <a:rPr lang="en-US" smtClean="0"/>
+              <a:rPr lang="en-US"/>
               <a:t>Third level</a:t>
             </a:r>
           </a:p>
           <a:p>
             <a:pPr lvl="3"/>
             <a:r>
-              <a:rPr lang="en-US" smtClean="0"/>
+              <a:rPr lang="en-US"/>
               <a:t>Fourth level</a:t>
             </a:r>
           </a:p>
           <a:p>
             <a:pPr lvl="4"/>
             <a:r>
-              <a:rPr lang="en-US" smtClean="0"/>
+              <a:rPr lang="en-US"/>
               <a:t>Fifth level</a:t>
             </a:r>
-            <a:endParaRPr lang="en-US"/>
           </a:p>
         </p:txBody>
       </p:sp>
@@ -666,7 +664,7 @@
           <a:p>
             <a:fld id="{8EB41EDE-76F8-194F-86A0-E34104B94575}" type="datetimeFigureOut">
               <a:rPr lang="en-US" smtClean="0"/>
-              <a:t>10/11/2017</a:t>
+              <a:t>8/17/2018</a:t>
             </a:fld>
             <a:endParaRPr lang="en-US"/>
           </a:p>
@@ -760,10 +758,9 @@
           <a:lstStyle/>
           <a:p>
             <a:r>
-              <a:rPr lang="en-US" smtClean="0"/>
+              <a:rPr lang="en-US"/>
               <a:t>Click to edit Master title style</a:t>
             </a:r>
-            <a:endParaRPr lang="en-US"/>
           </a:p>
         </p:txBody>
       </p:sp>
@@ -784,38 +781,37 @@
           <a:p>
             <a:pPr lvl="0"/>
             <a:r>
-              <a:rPr lang="en-US" smtClean="0"/>
+              <a:rPr lang="en-US"/>
               <a:t>Click to edit Master text styles</a:t>
             </a:r>
           </a:p>
           <a:p>
             <a:pPr lvl="1"/>
             <a:r>
-              <a:rPr lang="en-US" smtClean="0"/>
+              <a:rPr lang="en-US"/>
               <a:t>Second level</a:t>
             </a:r>
           </a:p>
           <a:p>
             <a:pPr lvl="2"/>
             <a:r>
-              <a:rPr lang="en-US" smtClean="0"/>
+              <a:rPr lang="en-US"/>
               <a:t>Third level</a:t>
             </a:r>
           </a:p>
           <a:p>
             <a:pPr lvl="3"/>
             <a:r>
-              <a:rPr lang="en-US" smtClean="0"/>
+              <a:rPr lang="en-US"/>
               <a:t>Fourth level</a:t>
             </a:r>
           </a:p>
           <a:p>
             <a:pPr lvl="4"/>
             <a:r>
-              <a:rPr lang="en-US" smtClean="0"/>
+              <a:rPr lang="en-US"/>
               <a:t>Fifth level</a:t>
             </a:r>
-            <a:endParaRPr lang="en-US"/>
           </a:p>
         </p:txBody>
       </p:sp>
@@ -836,7 +832,7 @@
           <a:p>
             <a:fld id="{8EB41EDE-76F8-194F-86A0-E34104B94575}" type="datetimeFigureOut">
               <a:rPr lang="en-US" smtClean="0"/>
-              <a:t>10/11/2017</a:t>
+              <a:t>8/17/2018</a:t>
             </a:fld>
             <a:endParaRPr lang="en-US"/>
           </a:p>
@@ -939,10 +935,9 @@
           </a:lstStyle>
           <a:p>
             <a:r>
-              <a:rPr lang="en-US" smtClean="0"/>
+              <a:rPr lang="en-US"/>
               <a:t>Click to edit Master title style</a:t>
             </a:r>
-            <a:endParaRPr lang="en-US"/>
           </a:p>
         </p:txBody>
       </p:sp>
@@ -1059,7 +1054,7 @@
           <a:p>
             <a:pPr lvl="0"/>
             <a:r>
-              <a:rPr lang="en-US" smtClean="0"/>
+              <a:rPr lang="en-US"/>
               <a:t>Click to edit Master text styles</a:t>
             </a:r>
           </a:p>
@@ -1082,7 +1077,7 @@
           <a:p>
             <a:fld id="{8EB41EDE-76F8-194F-86A0-E34104B94575}" type="datetimeFigureOut">
               <a:rPr lang="en-US" smtClean="0"/>
-              <a:t>10/11/2017</a:t>
+              <a:t>8/17/2018</a:t>
             </a:fld>
             <a:endParaRPr lang="en-US"/>
           </a:p>
@@ -1176,10 +1171,9 @@
           <a:lstStyle/>
           <a:p>
             <a:r>
-              <a:rPr lang="en-US" smtClean="0"/>
+              <a:rPr lang="en-US"/>
               <a:t>Click to edit Master title style</a:t>
             </a:r>
-            <a:endParaRPr lang="en-US"/>
           </a:p>
         </p:txBody>
       </p:sp>
@@ -1233,38 +1227,37 @@
           <a:p>
             <a:pPr lvl="0"/>
             <a:r>
-              <a:rPr lang="en-US" smtClean="0"/>
+              <a:rPr lang="en-US"/>
               <a:t>Click to edit Master text styles</a:t>
             </a:r>
           </a:p>
           <a:p>
             <a:pPr lvl="1"/>
             <a:r>
-              <a:rPr lang="en-US" smtClean="0"/>
+              <a:rPr lang="en-US"/>
               <a:t>Second level</a:t>
             </a:r>
           </a:p>
           <a:p>
             <a:pPr lvl="2"/>
             <a:r>
-              <a:rPr lang="en-US" smtClean="0"/>
+              <a:rPr lang="en-US"/>
               <a:t>Third level</a:t>
             </a:r>
           </a:p>
           <a:p>
             <a:pPr lvl="3"/>
             <a:r>
-              <a:rPr lang="en-US" smtClean="0"/>
+              <a:rPr lang="en-US"/>
               <a:t>Fourth level</a:t>
             </a:r>
           </a:p>
           <a:p>
             <a:pPr lvl="4"/>
             <a:r>
-              <a:rPr lang="en-US" smtClean="0"/>
+              <a:rPr lang="en-US"/>
               <a:t>Fifth level</a:t>
             </a:r>
-            <a:endParaRPr lang="en-US"/>
           </a:p>
         </p:txBody>
       </p:sp>
@@ -1318,38 +1311,37 @@
           <a:p>
             <a:pPr lvl="0"/>
             <a:r>
-              <a:rPr lang="en-US" smtClean="0"/>
+              <a:rPr lang="en-US"/>
               <a:t>Click to edit Master text styles</a:t>
             </a:r>
           </a:p>
           <a:p>
             <a:pPr lvl="1"/>
             <a:r>
-              <a:rPr lang="en-US" smtClean="0"/>
+              <a:rPr lang="en-US"/>
               <a:t>Second level</a:t>
             </a:r>
           </a:p>
           <a:p>
             <a:pPr lvl="2"/>
             <a:r>
-              <a:rPr lang="en-US" smtClean="0"/>
+              <a:rPr lang="en-US"/>
               <a:t>Third level</a:t>
             </a:r>
           </a:p>
           <a:p>
             <a:pPr lvl="3"/>
             <a:r>
-              <a:rPr lang="en-US" smtClean="0"/>
+              <a:rPr lang="en-US"/>
               <a:t>Fourth level</a:t>
             </a:r>
           </a:p>
           <a:p>
             <a:pPr lvl="4"/>
             <a:r>
-              <a:rPr lang="en-US" smtClean="0"/>
+              <a:rPr lang="en-US"/>
               <a:t>Fifth level</a:t>
             </a:r>
-            <a:endParaRPr lang="en-US"/>
           </a:p>
         </p:txBody>
       </p:sp>
@@ -1370,7 +1362,7 @@
           <a:p>
             <a:fld id="{8EB41EDE-76F8-194F-86A0-E34104B94575}" type="datetimeFigureOut">
               <a:rPr lang="en-US" smtClean="0"/>
-              <a:t>10/11/2017</a:t>
+              <a:t>8/17/2018</a:t>
             </a:fld>
             <a:endParaRPr lang="en-US"/>
           </a:p>
@@ -1468,10 +1460,9 @@
           </a:lstStyle>
           <a:p>
             <a:r>
-              <a:rPr lang="en-US" smtClean="0"/>
+              <a:rPr lang="en-US"/>
               <a:t>Click to edit Master title style</a:t>
             </a:r>
-            <a:endParaRPr lang="en-US"/>
           </a:p>
         </p:txBody>
       </p:sp>
@@ -1534,7 +1525,7 @@
           <a:p>
             <a:pPr lvl="0"/>
             <a:r>
-              <a:rPr lang="en-US" smtClean="0"/>
+              <a:rPr lang="en-US"/>
               <a:t>Click to edit Master text styles</a:t>
             </a:r>
           </a:p>
@@ -1590,38 +1581,37 @@
           <a:p>
             <a:pPr lvl="0"/>
             <a:r>
-              <a:rPr lang="en-US" smtClean="0"/>
+              <a:rPr lang="en-US"/>
               <a:t>Click to edit Master text styles</a:t>
             </a:r>
           </a:p>
           <a:p>
             <a:pPr lvl="1"/>
             <a:r>
-              <a:rPr lang="en-US" smtClean="0"/>
+              <a:rPr lang="en-US"/>
               <a:t>Second level</a:t>
             </a:r>
           </a:p>
           <a:p>
             <a:pPr lvl="2"/>
             <a:r>
-              <a:rPr lang="en-US" smtClean="0"/>
+              <a:rPr lang="en-US"/>
               <a:t>Third level</a:t>
             </a:r>
           </a:p>
           <a:p>
             <a:pPr lvl="3"/>
             <a:r>
-              <a:rPr lang="en-US" smtClean="0"/>
+              <a:rPr lang="en-US"/>
               <a:t>Fourth level</a:t>
             </a:r>
           </a:p>
           <a:p>
             <a:pPr lvl="4"/>
             <a:r>
-              <a:rPr lang="en-US" smtClean="0"/>
+              <a:rPr lang="en-US"/>
               <a:t>Fifth level</a:t>
             </a:r>
-            <a:endParaRPr lang="en-US"/>
           </a:p>
         </p:txBody>
       </p:sp>
@@ -1684,7 +1674,7 @@
           <a:p>
             <a:pPr lvl="0"/>
             <a:r>
-              <a:rPr lang="en-US" smtClean="0"/>
+              <a:rPr lang="en-US"/>
               <a:t>Click to edit Master text styles</a:t>
             </a:r>
           </a:p>
@@ -1740,38 +1730,37 @@
           <a:p>
             <a:pPr lvl="0"/>
             <a:r>
-              <a:rPr lang="en-US" smtClean="0"/>
+              <a:rPr lang="en-US"/>
               <a:t>Click to edit Master text styles</a:t>
             </a:r>
           </a:p>
           <a:p>
             <a:pPr lvl="1"/>
             <a:r>
-              <a:rPr lang="en-US" smtClean="0"/>
+              <a:rPr lang="en-US"/>
               <a:t>Second level</a:t>
             </a:r>
           </a:p>
           <a:p>
             <a:pPr lvl="2"/>
             <a:r>
-              <a:rPr lang="en-US" smtClean="0"/>
+              <a:rPr lang="en-US"/>
               <a:t>Third level</a:t>
             </a:r>
           </a:p>
           <a:p>
             <a:pPr lvl="3"/>
             <a:r>
-              <a:rPr lang="en-US" smtClean="0"/>
+              <a:rPr lang="en-US"/>
               <a:t>Fourth level</a:t>
             </a:r>
           </a:p>
           <a:p>
             <a:pPr lvl="4"/>
             <a:r>
-              <a:rPr lang="en-US" smtClean="0"/>
+              <a:rPr lang="en-US"/>
               <a:t>Fifth level</a:t>
             </a:r>
-            <a:endParaRPr lang="en-US"/>
           </a:p>
         </p:txBody>
       </p:sp>
@@ -1792,7 +1781,7 @@
           <a:p>
             <a:fld id="{8EB41EDE-76F8-194F-86A0-E34104B94575}" type="datetimeFigureOut">
               <a:rPr lang="en-US" smtClean="0"/>
-              <a:t>10/11/2017</a:t>
+              <a:t>8/17/2018</a:t>
             </a:fld>
             <a:endParaRPr lang="en-US"/>
           </a:p>
@@ -1886,10 +1875,9 @@
           <a:lstStyle/>
           <a:p>
             <a:r>
-              <a:rPr lang="en-US" smtClean="0"/>
+              <a:rPr lang="en-US"/>
               <a:t>Click to edit Master title style</a:t>
             </a:r>
-            <a:endParaRPr lang="en-US"/>
           </a:p>
         </p:txBody>
       </p:sp>
@@ -1910,7 +1898,7 @@
           <a:p>
             <a:fld id="{8EB41EDE-76F8-194F-86A0-E34104B94575}" type="datetimeFigureOut">
               <a:rPr lang="en-US" smtClean="0"/>
-              <a:t>10/11/2017</a:t>
+              <a:t>8/17/2018</a:t>
             </a:fld>
             <a:endParaRPr lang="en-US"/>
           </a:p>
@@ -2005,7 +1993,7 @@
           <a:p>
             <a:fld id="{8EB41EDE-76F8-194F-86A0-E34104B94575}" type="datetimeFigureOut">
               <a:rPr lang="en-US" smtClean="0"/>
-              <a:t>10/11/2017</a:t>
+              <a:t>8/17/2018</a:t>
             </a:fld>
             <a:endParaRPr lang="en-US"/>
           </a:p>
@@ -2108,10 +2096,9 @@
           </a:lstStyle>
           <a:p>
             <a:r>
-              <a:rPr lang="en-US" smtClean="0"/>
+              <a:rPr lang="en-US"/>
               <a:t>Click to edit Master title style</a:t>
             </a:r>
-            <a:endParaRPr lang="en-US"/>
           </a:p>
         </p:txBody>
       </p:sp>
@@ -2165,38 +2152,37 @@
           <a:p>
             <a:pPr lvl="0"/>
             <a:r>
-              <a:rPr lang="en-US" smtClean="0"/>
+              <a:rPr lang="en-US"/>
               <a:t>Click to edit Master text styles</a:t>
             </a:r>
           </a:p>
           <a:p>
             <a:pPr lvl="1"/>
             <a:r>
-              <a:rPr lang="en-US" smtClean="0"/>
+              <a:rPr lang="en-US"/>
               <a:t>Second level</a:t>
             </a:r>
           </a:p>
           <a:p>
             <a:pPr lvl="2"/>
             <a:r>
-              <a:rPr lang="en-US" smtClean="0"/>
+              <a:rPr lang="en-US"/>
               <a:t>Third level</a:t>
             </a:r>
           </a:p>
           <a:p>
             <a:pPr lvl="3"/>
             <a:r>
-              <a:rPr lang="en-US" smtClean="0"/>
+              <a:rPr lang="en-US"/>
               <a:t>Fourth level</a:t>
             </a:r>
           </a:p>
           <a:p>
             <a:pPr lvl="4"/>
             <a:r>
-              <a:rPr lang="en-US" smtClean="0"/>
+              <a:rPr lang="en-US"/>
               <a:t>Fifth level</a:t>
             </a:r>
-            <a:endParaRPr lang="en-US"/>
           </a:p>
         </p:txBody>
       </p:sp>
@@ -2259,7 +2245,7 @@
           <a:p>
             <a:pPr lvl="0"/>
             <a:r>
-              <a:rPr lang="en-US" smtClean="0"/>
+              <a:rPr lang="en-US"/>
               <a:t>Click to edit Master text styles</a:t>
             </a:r>
           </a:p>
@@ -2282,7 +2268,7 @@
           <a:p>
             <a:fld id="{8EB41EDE-76F8-194F-86A0-E34104B94575}" type="datetimeFigureOut">
               <a:rPr lang="en-US" smtClean="0"/>
-              <a:t>10/11/2017</a:t>
+              <a:t>8/17/2018</a:t>
             </a:fld>
             <a:endParaRPr lang="en-US"/>
           </a:p>
@@ -2385,10 +2371,9 @@
           </a:lstStyle>
           <a:p>
             <a:r>
-              <a:rPr lang="en-US" smtClean="0"/>
+              <a:rPr lang="en-US"/>
               <a:t>Click to edit Master title style</a:t>
             </a:r>
-            <a:endParaRPr lang="en-US"/>
           </a:p>
         </p:txBody>
       </p:sp>
@@ -2512,7 +2497,7 @@
           <a:p>
             <a:pPr lvl="0"/>
             <a:r>
-              <a:rPr lang="en-US" smtClean="0"/>
+              <a:rPr lang="en-US"/>
               <a:t>Click to edit Master text styles</a:t>
             </a:r>
           </a:p>
@@ -2535,7 +2520,7 @@
           <a:p>
             <a:fld id="{8EB41EDE-76F8-194F-86A0-E34104B94575}" type="datetimeFigureOut">
               <a:rPr lang="en-US" smtClean="0"/>
-              <a:t>10/11/2017</a:t>
+              <a:t>8/17/2018</a:t>
             </a:fld>
             <a:endParaRPr lang="en-US"/>
           </a:p>
@@ -2644,10 +2629,9 @@
           <a:lstStyle/>
           <a:p>
             <a:r>
-              <a:rPr lang="en-US" smtClean="0"/>
+              <a:rPr lang="en-US"/>
               <a:t>Click to edit Master title style</a:t>
             </a:r>
-            <a:endParaRPr lang="en-US"/>
           </a:p>
         </p:txBody>
       </p:sp>
@@ -2678,38 +2662,37 @@
           <a:p>
             <a:pPr lvl="0"/>
             <a:r>
-              <a:rPr lang="en-US" smtClean="0"/>
+              <a:rPr lang="en-US"/>
               <a:t>Click to edit Master text styles</a:t>
             </a:r>
           </a:p>
           <a:p>
             <a:pPr lvl="1"/>
             <a:r>
-              <a:rPr lang="en-US" smtClean="0"/>
+              <a:rPr lang="en-US"/>
               <a:t>Second level</a:t>
             </a:r>
           </a:p>
           <a:p>
             <a:pPr lvl="2"/>
             <a:r>
-              <a:rPr lang="en-US" smtClean="0"/>
+              <a:rPr lang="en-US"/>
               <a:t>Third level</a:t>
             </a:r>
           </a:p>
           <a:p>
             <a:pPr lvl="3"/>
             <a:r>
-              <a:rPr lang="en-US" smtClean="0"/>
+              <a:rPr lang="en-US"/>
               <a:t>Fourth level</a:t>
             </a:r>
           </a:p>
           <a:p>
             <a:pPr lvl="4"/>
             <a:r>
-              <a:rPr lang="en-US" smtClean="0"/>
+              <a:rPr lang="en-US"/>
               <a:t>Fifth level</a:t>
             </a:r>
-            <a:endParaRPr lang="en-US"/>
           </a:p>
         </p:txBody>
       </p:sp>
@@ -2748,7 +2731,7 @@
           <a:p>
             <a:fld id="{8EB41EDE-76F8-194F-86A0-E34104B94575}" type="datetimeFigureOut">
               <a:rPr lang="en-US" smtClean="0"/>
-              <a:t>10/11/2017</a:t>
+              <a:t>8/17/2018</a:t>
             </a:fld>
             <a:endParaRPr lang="en-US"/>
           </a:p>
@@ -3642,7 +3625,7 @@
               <a:avLst/>
             </a:prstGeom>
             <a:solidFill>
-              <a:srgbClr val="22A6F5"/>
+              <a:srgbClr val="E4790A"/>
             </a:solidFill>
             <a:ln>
               <a:noFill/>
@@ -4337,7 +4320,7 @@
               <a:avLst/>
             </a:prstGeom>
             <a:solidFill>
-              <a:srgbClr val="1874CD"/>
+              <a:srgbClr val="E4790A"/>
             </a:solidFill>
             <a:ln>
               <a:noFill/>

</xml_diff>